<commit_message>
date and early registration
</commit_message>
<xml_diff>
--- a/BEIJING_img/新建 Microsoft PowerPoint 演示文稿.pptx
+++ b/BEIJING_img/新建 Microsoft PowerPoint 演示文稿.pptx
@@ -270,7 +270,7 @@
           <a:p>
             <a:fld id="{77312464-4168-4D6A-8D48-09A2E6083E2B}" type="datetimeFigureOut">
               <a:rPr lang="zh-CN" altLang="en-US" smtClean="0"/>
-              <a:t>2024-6-7</a:t>
+              <a:t>2024-6-12</a:t>
             </a:fld>
             <a:endParaRPr lang="zh-CN" altLang="en-US"/>
           </a:p>
@@ -468,7 +468,7 @@
           <a:p>
             <a:fld id="{77312464-4168-4D6A-8D48-09A2E6083E2B}" type="datetimeFigureOut">
               <a:rPr lang="zh-CN" altLang="en-US" smtClean="0"/>
-              <a:t>2024-6-7</a:t>
+              <a:t>2024-6-12</a:t>
             </a:fld>
             <a:endParaRPr lang="zh-CN" altLang="en-US"/>
           </a:p>
@@ -676,7 +676,7 @@
           <a:p>
             <a:fld id="{77312464-4168-4D6A-8D48-09A2E6083E2B}" type="datetimeFigureOut">
               <a:rPr lang="zh-CN" altLang="en-US" smtClean="0"/>
-              <a:t>2024-6-7</a:t>
+              <a:t>2024-6-12</a:t>
             </a:fld>
             <a:endParaRPr lang="zh-CN" altLang="en-US"/>
           </a:p>
@@ -874,7 +874,7 @@
           <a:p>
             <a:fld id="{77312464-4168-4D6A-8D48-09A2E6083E2B}" type="datetimeFigureOut">
               <a:rPr lang="zh-CN" altLang="en-US" smtClean="0"/>
-              <a:t>2024-6-7</a:t>
+              <a:t>2024-6-12</a:t>
             </a:fld>
             <a:endParaRPr lang="zh-CN" altLang="en-US"/>
           </a:p>
@@ -1149,7 +1149,7 @@
           <a:p>
             <a:fld id="{77312464-4168-4D6A-8D48-09A2E6083E2B}" type="datetimeFigureOut">
               <a:rPr lang="zh-CN" altLang="en-US" smtClean="0"/>
-              <a:t>2024-6-7</a:t>
+              <a:t>2024-6-12</a:t>
             </a:fld>
             <a:endParaRPr lang="zh-CN" altLang="en-US"/>
           </a:p>
@@ -1414,7 +1414,7 @@
           <a:p>
             <a:fld id="{77312464-4168-4D6A-8D48-09A2E6083E2B}" type="datetimeFigureOut">
               <a:rPr lang="zh-CN" altLang="en-US" smtClean="0"/>
-              <a:t>2024-6-7</a:t>
+              <a:t>2024-6-12</a:t>
             </a:fld>
             <a:endParaRPr lang="zh-CN" altLang="en-US"/>
           </a:p>
@@ -1826,7 +1826,7 @@
           <a:p>
             <a:fld id="{77312464-4168-4D6A-8D48-09A2E6083E2B}" type="datetimeFigureOut">
               <a:rPr lang="zh-CN" altLang="en-US" smtClean="0"/>
-              <a:t>2024-6-7</a:t>
+              <a:t>2024-6-12</a:t>
             </a:fld>
             <a:endParaRPr lang="zh-CN" altLang="en-US"/>
           </a:p>
@@ -1967,7 +1967,7 @@
           <a:p>
             <a:fld id="{77312464-4168-4D6A-8D48-09A2E6083E2B}" type="datetimeFigureOut">
               <a:rPr lang="zh-CN" altLang="en-US" smtClean="0"/>
-              <a:t>2024-6-7</a:t>
+              <a:t>2024-6-12</a:t>
             </a:fld>
             <a:endParaRPr lang="zh-CN" altLang="en-US"/>
           </a:p>
@@ -2080,7 +2080,7 @@
           <a:p>
             <a:fld id="{77312464-4168-4D6A-8D48-09A2E6083E2B}" type="datetimeFigureOut">
               <a:rPr lang="zh-CN" altLang="en-US" smtClean="0"/>
-              <a:t>2024-6-7</a:t>
+              <a:t>2024-6-12</a:t>
             </a:fld>
             <a:endParaRPr lang="zh-CN" altLang="en-US"/>
           </a:p>
@@ -2391,7 +2391,7 @@
           <a:p>
             <a:fld id="{77312464-4168-4D6A-8D48-09A2E6083E2B}" type="datetimeFigureOut">
               <a:rPr lang="zh-CN" altLang="en-US" smtClean="0"/>
-              <a:t>2024-6-7</a:t>
+              <a:t>2024-6-12</a:t>
             </a:fld>
             <a:endParaRPr lang="zh-CN" altLang="en-US"/>
           </a:p>
@@ -2679,7 +2679,7 @@
           <a:p>
             <a:fld id="{77312464-4168-4D6A-8D48-09A2E6083E2B}" type="datetimeFigureOut">
               <a:rPr lang="zh-CN" altLang="en-US" smtClean="0"/>
-              <a:t>2024-6-7</a:t>
+              <a:t>2024-6-12</a:t>
             </a:fld>
             <a:endParaRPr lang="zh-CN" altLang="en-US"/>
           </a:p>
@@ -2920,7 +2920,7 @@
           <a:p>
             <a:fld id="{77312464-4168-4D6A-8D48-09A2E6083E2B}" type="datetimeFigureOut">
               <a:rPr lang="zh-CN" altLang="en-US" smtClean="0"/>
-              <a:t>2024-6-7</a:t>
+              <a:t>2024-6-12</a:t>
             </a:fld>
             <a:endParaRPr lang="zh-CN" altLang="en-US"/>
           </a:p>
@@ -3668,7 +3668,17 @@
                 <a:t>Local Organizing Committee | </a:t>
               </a:r>
               <a:r>
-                <a:rPr lang="en-US" altLang="zh-CN" sz="2400" dirty="0" err="1">
+                <a:rPr lang="en-US" altLang="zh-CN" sz="2000" dirty="0">
+                  <a:solidFill>
+                    <a:schemeClr val="bg1"/>
+                  </a:solidFill>
+                  <a:latin typeface="Times New Roman" panose="02020603050405020304" pitchFamily="18" charset="0"/>
+                  <a:cs typeface="Times New Roman" panose="02020603050405020304" pitchFamily="18" charset="0"/>
+                </a:rPr>
+                <a:t>School of Transportation Science and Engineering, </a:t>
+              </a:r>
+              <a:r>
+                <a:rPr lang="en-US" altLang="zh-CN" sz="2000" dirty="0" err="1">
                   <a:solidFill>
                     <a:schemeClr val="bg1"/>
                   </a:solidFill>
@@ -3678,7 +3688,7 @@
                 <a:t>Beihang</a:t>
               </a:r>
               <a:r>
-                <a:rPr lang="en-US" altLang="zh-CN" sz="2400" dirty="0">
+                <a:rPr lang="en-US" altLang="zh-CN" sz="2000" dirty="0">
                   <a:solidFill>
                     <a:schemeClr val="bg1"/>
                   </a:solidFill>
@@ -3687,6 +3697,13 @@
                 </a:rPr>
                 <a:t> University</a:t>
               </a:r>
+              <a:endParaRPr lang="en-US" altLang="zh-CN" sz="2400" dirty="0">
+                <a:solidFill>
+                  <a:schemeClr val="bg1"/>
+                </a:solidFill>
+                <a:latin typeface="Times New Roman" panose="02020603050405020304" pitchFamily="18" charset="0"/>
+                <a:cs typeface="Times New Roman" panose="02020603050405020304" pitchFamily="18" charset="0"/>
+              </a:endParaRPr>
             </a:p>
             <a:p>
               <a:pPr>

</xml_diff>